<commit_message>
fix some issues + comments
</commit_message>
<xml_diff>
--- a/P7.pptx
+++ b/P7.pptx
@@ -2670,7 +2670,7 @@
           <a:p>
             <a:fld id="{6A4922AC-46CB-49BF-90C3-10269EC4F5A8}" type="datetimeFigureOut">
               <a:rPr lang="fr-FR" smtClean="0"/>
-              <a:t>20/01/2023</a:t>
+              <a:t>06/03/2023</a:t>
             </a:fld>
             <a:endParaRPr lang="fr-FR"/>
           </a:p>
@@ -2868,7 +2868,7 @@
           <a:p>
             <a:fld id="{6A4922AC-46CB-49BF-90C3-10269EC4F5A8}" type="datetimeFigureOut">
               <a:rPr lang="fr-FR" smtClean="0"/>
-              <a:t>20/01/2023</a:t>
+              <a:t>06/03/2023</a:t>
             </a:fld>
             <a:endParaRPr lang="fr-FR"/>
           </a:p>
@@ -3076,7 +3076,7 @@
           <a:p>
             <a:fld id="{6A4922AC-46CB-49BF-90C3-10269EC4F5A8}" type="datetimeFigureOut">
               <a:rPr lang="fr-FR" smtClean="0"/>
-              <a:t>20/01/2023</a:t>
+              <a:t>06/03/2023</a:t>
             </a:fld>
             <a:endParaRPr lang="fr-FR"/>
           </a:p>
@@ -3274,7 +3274,7 @@
           <a:p>
             <a:fld id="{6A4922AC-46CB-49BF-90C3-10269EC4F5A8}" type="datetimeFigureOut">
               <a:rPr lang="fr-FR" smtClean="0"/>
-              <a:t>20/01/2023</a:t>
+              <a:t>06/03/2023</a:t>
             </a:fld>
             <a:endParaRPr lang="fr-FR"/>
           </a:p>
@@ -3549,7 +3549,7 @@
           <a:p>
             <a:fld id="{6A4922AC-46CB-49BF-90C3-10269EC4F5A8}" type="datetimeFigureOut">
               <a:rPr lang="fr-FR" smtClean="0"/>
-              <a:t>20/01/2023</a:t>
+              <a:t>06/03/2023</a:t>
             </a:fld>
             <a:endParaRPr lang="fr-FR"/>
           </a:p>
@@ -3814,7 +3814,7 @@
           <a:p>
             <a:fld id="{6A4922AC-46CB-49BF-90C3-10269EC4F5A8}" type="datetimeFigureOut">
               <a:rPr lang="fr-FR" smtClean="0"/>
-              <a:t>20/01/2023</a:t>
+              <a:t>06/03/2023</a:t>
             </a:fld>
             <a:endParaRPr lang="fr-FR"/>
           </a:p>
@@ -4226,7 +4226,7 @@
           <a:p>
             <a:fld id="{6A4922AC-46CB-49BF-90C3-10269EC4F5A8}" type="datetimeFigureOut">
               <a:rPr lang="fr-FR" smtClean="0"/>
-              <a:t>20/01/2023</a:t>
+              <a:t>06/03/2023</a:t>
             </a:fld>
             <a:endParaRPr lang="fr-FR"/>
           </a:p>
@@ -4367,7 +4367,7 @@
           <a:p>
             <a:fld id="{6A4922AC-46CB-49BF-90C3-10269EC4F5A8}" type="datetimeFigureOut">
               <a:rPr lang="fr-FR" smtClean="0"/>
-              <a:t>20/01/2023</a:t>
+              <a:t>06/03/2023</a:t>
             </a:fld>
             <a:endParaRPr lang="fr-FR"/>
           </a:p>
@@ -4480,7 +4480,7 @@
           <a:p>
             <a:fld id="{6A4922AC-46CB-49BF-90C3-10269EC4F5A8}" type="datetimeFigureOut">
               <a:rPr lang="fr-FR" smtClean="0"/>
-              <a:t>20/01/2023</a:t>
+              <a:t>06/03/2023</a:t>
             </a:fld>
             <a:endParaRPr lang="fr-FR"/>
           </a:p>
@@ -4791,7 +4791,7 @@
           <a:p>
             <a:fld id="{6A4922AC-46CB-49BF-90C3-10269EC4F5A8}" type="datetimeFigureOut">
               <a:rPr lang="fr-FR" smtClean="0"/>
-              <a:t>20/01/2023</a:t>
+              <a:t>06/03/2023</a:t>
             </a:fld>
             <a:endParaRPr lang="fr-FR"/>
           </a:p>
@@ -5079,7 +5079,7 @@
           <a:p>
             <a:fld id="{6A4922AC-46CB-49BF-90C3-10269EC4F5A8}" type="datetimeFigureOut">
               <a:rPr lang="fr-FR" smtClean="0"/>
-              <a:t>20/01/2023</a:t>
+              <a:t>06/03/2023</a:t>
             </a:fld>
             <a:endParaRPr lang="fr-FR"/>
           </a:p>
@@ -5320,7 +5320,7 @@
           <a:p>
             <a:fld id="{6A4922AC-46CB-49BF-90C3-10269EC4F5A8}" type="datetimeFigureOut">
               <a:rPr lang="fr-FR" smtClean="0"/>
-              <a:t>20/01/2023</a:t>
+              <a:t>06/03/2023</a:t>
             </a:fld>
             <a:endParaRPr lang="fr-FR"/>
           </a:p>
@@ -5911,7 +5911,7 @@
           <a:lstStyle/>
           <a:p>
             <a:r>
-              <a:rPr lang="en-US" sz="2600" kern="1200">
+              <a:rPr lang="en-US" sz="2600" kern="1200" dirty="0">
                 <a:solidFill>
                   <a:srgbClr val="FFFFFF"/>
                 </a:solidFill>
@@ -5919,7 +5919,7 @@
                 <a:ea typeface="+mj-ea"/>
                 <a:cs typeface="+mj-cs"/>
               </a:rPr>
-              <a:t>P7. Fisheye</a:t>
+              <a:t>P7. Petits Plats</a:t>
             </a:r>
           </a:p>
         </p:txBody>
@@ -6053,7 +6053,7 @@
       </p:par>
     </p:tnLst>
     <p:bldLst>
-      <p:bldP spid="2" grpId="0"/>
+      <p:bldP spid="2" grpId="0" animBg="1"/>
     </p:bldLst>
   </p:timing>
 </p:sld>
@@ -6443,13 +6443,8 @@
             </a:pPr>
             <a:r>
               <a:rPr lang="fr-FR" sz="2400" dirty="0"/>
-              <a:t>Repository </a:t>
+              <a:t>Repository GitHub</a:t>
             </a:r>
-            <a:r>
-              <a:rPr lang="fr-FR" sz="2400" dirty="0" err="1"/>
-              <a:t>Github</a:t>
-            </a:r>
-            <a:endParaRPr lang="fr-FR" sz="2400" dirty="0"/>
           </a:p>
           <a:p>
             <a:pPr marL="514350" indent="-514350">
@@ -6458,17 +6453,7 @@
             </a:pPr>
             <a:r>
               <a:rPr lang="fr-FR" sz="2400" dirty="0"/>
-              <a:t>Fiche D’investigation TODO</a:t>
-            </a:r>
-          </a:p>
-          <a:p>
-            <a:pPr marL="514350" indent="-514350">
-              <a:buFont typeface="+mj-lt"/>
-              <a:buAutoNum type="arabicPeriod"/>
-            </a:pPr>
-            <a:r>
-              <a:rPr lang="fr-FR" sz="2400" dirty="0"/>
-              <a:t>Diagrammes</a:t>
+              <a:t>Fiche D’investigation</a:t>
             </a:r>
           </a:p>
           <a:p>
@@ -7361,7 +7346,7 @@
           <a:p>
             <a:pPr algn="r"/>
             <a:r>
-              <a:rPr lang="en-US" sz="4800" kern="1200">
+              <a:rPr lang="en-US" sz="4800" kern="1200" dirty="0">
                 <a:solidFill>
                   <a:schemeClr val="bg1"/>
                 </a:solidFill>
@@ -7369,52 +7354,7 @@
                 <a:ea typeface="+mj-ea"/>
                 <a:cs typeface="+mj-cs"/>
               </a:rPr>
-              <a:t>Fiche d’investigation</a:t>
-            </a:r>
-          </a:p>
-        </p:txBody>
-      </p:sp>
-      <p:sp>
-        <p:nvSpPr>
-          <p:cNvPr id="3" name="Espace réservé du contenu 2">
-            <a:extLst>
-              <a:ext uri="{FF2B5EF4-FFF2-40B4-BE49-F238E27FC236}">
-                <a16:creationId xmlns:a16="http://schemas.microsoft.com/office/drawing/2014/main" id="{42A97579-917A-365D-5D09-A18C4A9F009C}"/>
-              </a:ext>
-            </a:extLst>
-          </p:cNvPr>
-          <p:cNvSpPr>
-            <a:spLocks noGrp="1"/>
-          </p:cNvSpPr>
-          <p:nvPr>
-            <p:ph idx="1"/>
-          </p:nvPr>
-        </p:nvSpPr>
-        <p:spPr>
-          <a:xfrm>
-            <a:off x="8438729" y="965198"/>
-            <a:ext cx="2707937" cy="4927602"/>
-          </a:xfrm>
-        </p:spPr>
-        <p:txBody>
-          <a:bodyPr vert="horz" lIns="91440" tIns="45720" rIns="91440" bIns="45720" rtlCol="0" anchor="ctr">
-            <a:normAutofit/>
-          </a:bodyPr>
-          <a:lstStyle/>
-          <a:p>
-            <a:pPr marL="0" indent="0">
-              <a:buNone/>
-            </a:pPr>
-            <a:r>
-              <a:rPr lang="en-US" sz="2000" kern="1200">
-                <a:solidFill>
-                  <a:srgbClr val="FFC000"/>
-                </a:solidFill>
-                <a:latin typeface="+mn-lt"/>
-                <a:ea typeface="+mn-ea"/>
-                <a:cs typeface="+mn-cs"/>
-              </a:rPr>
-              <a:t>TODO</a:t>
+              <a:t>Fiche investigation</a:t>
             </a:r>
           </a:p>
         </p:txBody>

</xml_diff>